<commit_message>
Subir version beta v1
</commit_message>
<xml_diff>
--- a/Proyecto/Presentaciones/Primera presentación del proyecto.pptx
+++ b/Proyecto/Presentaciones/Primera presentación del proyecto.pptx
@@ -7760,7 +7760,7 @@
             <a:tbl>
               <a:tblPr>
                 <a:noFill/>
-                <a:tableStyleId>{3C7A60A5-2AED-420C-9F98-996F20EB2C53}</a:tableStyleId>
+                <a:tableStyleId>{BCE7218D-E876-4FF7-9C88-43A1D04D8A40}</a:tableStyleId>
               </a:tblPr>
               <a:tblGrid>
                 <a:gridCol w="4080150"/>
@@ -9446,7 +9446,7 @@
             <a:tbl>
               <a:tblPr>
                 <a:noFill/>
-                <a:tableStyleId>{3C7A60A5-2AED-420C-9F98-996F20EB2C53}</a:tableStyleId>
+                <a:tableStyleId>{BCE7218D-E876-4FF7-9C88-43A1D04D8A40}</a:tableStyleId>
               </a:tblPr>
               <a:tblGrid>
                 <a:gridCol w="4308025"/>

</xml_diff>